<commit_message>
Updates slide 5. Updated the list of sprint issues
</commit_message>
<xml_diff>
--- a/Dec 2022 Sprint Review.pptx
+++ b/Dec 2022 Sprint Review.pptx
@@ -140,1092 +140,6 @@
     <p1510:client id="{051780FD-A002-4E3C-A89D-4151B591C4AD}" v="646" dt="2022-12-10T23:48:51.629"/>
   </p1510:revLst>
 </p1510:revInfo>
-</file>
-
-<file path=ppt/changesInfos/changesInfo1.xml><?xml version="1.0" encoding="utf-8"?>
-<pc:chgInfo xmlns:a="http://schemas.openxmlformats.org/drawingml/2006/main" xmlns:r="http://schemas.openxmlformats.org/officeDocument/2006/relationships" xmlns:ac="http://schemas.microsoft.com/office/drawing/2013/main/command" xmlns:pc="http://schemas.microsoft.com/office/powerpoint/2013/main/command">
-  <pc:docChgLst>
-    <pc:chgData name="Kelly Robertson" userId="1380f86364dddaff" providerId="LiveId" clId="{051780FD-A002-4E3C-A89D-4151B591C4AD}"/>
-    <pc:docChg chg="undo custSel addSld delSld modSld sldOrd modMainMaster">
-      <pc:chgData name="Kelly Robertson" userId="1380f86364dddaff" providerId="LiveId" clId="{051780FD-A002-4E3C-A89D-4151B591C4AD}" dt="2022-12-10T23:49:26.612" v="4769" actId="403"/>
-      <pc:docMkLst>
-        <pc:docMk/>
-      </pc:docMkLst>
-      <pc:sldChg chg="addSp delSp modSp mod modClrScheme delDesignElem chgLayout modNotesTx">
-        <pc:chgData name="Kelly Robertson" userId="1380f86364dddaff" providerId="LiveId" clId="{051780FD-A002-4E3C-A89D-4151B591C4AD}" dt="2022-12-07T02:21:46.536" v="3504" actId="404"/>
-        <pc:sldMkLst>
-          <pc:docMk/>
-          <pc:sldMk cId="1487700712" sldId="256"/>
-        </pc:sldMkLst>
-        <pc:spChg chg="mod ord">
-          <ac:chgData name="Kelly Robertson" userId="1380f86364dddaff" providerId="LiveId" clId="{051780FD-A002-4E3C-A89D-4151B591C4AD}" dt="2022-12-07T00:15:53.672" v="1117" actId="122"/>
-          <ac:spMkLst>
-            <pc:docMk/>
-            <pc:sldMk cId="1487700712" sldId="256"/>
-            <ac:spMk id="2" creationId="{C02C5318-1A1E-49D0-B2E2-A4B0FA9E8A40}"/>
-          </ac:spMkLst>
-        </pc:spChg>
-        <pc:spChg chg="mod ord">
-          <ac:chgData name="Kelly Robertson" userId="1380f86364dddaff" providerId="LiveId" clId="{051780FD-A002-4E3C-A89D-4151B591C4AD}" dt="2022-12-07T02:21:46.536" v="3504" actId="404"/>
-          <ac:spMkLst>
-            <pc:docMk/>
-            <pc:sldMk cId="1487700712" sldId="256"/>
-            <ac:spMk id="3" creationId="{48B6CF59-4E5B-494D-A2F7-97ADD01E6497}"/>
-          </ac:spMkLst>
-        </pc:spChg>
-        <pc:spChg chg="add del">
-          <ac:chgData name="Kelly Robertson" userId="1380f86364dddaff" providerId="LiveId" clId="{051780FD-A002-4E3C-A89D-4151B591C4AD}" dt="2022-12-07T00:13:44.532" v="1065" actId="700"/>
-          <ac:spMkLst>
-            <pc:docMk/>
-            <pc:sldMk cId="1487700712" sldId="256"/>
-            <ac:spMk id="15" creationId="{493D4EDA-58E0-40CC-B3CA-14CDEB349D24}"/>
-          </ac:spMkLst>
-        </pc:spChg>
-        <pc:spChg chg="add del">
-          <ac:chgData name="Kelly Robertson" userId="1380f86364dddaff" providerId="LiveId" clId="{051780FD-A002-4E3C-A89D-4151B591C4AD}" dt="2022-12-07T00:13:44.532" v="1065" actId="700"/>
-          <ac:spMkLst>
-            <pc:docMk/>
-            <pc:sldMk cId="1487700712" sldId="256"/>
-            <ac:spMk id="22" creationId="{4A2E7EC3-E07C-46CE-9B25-41865A50681C}"/>
-          </ac:spMkLst>
-        </pc:spChg>
-        <pc:grpChg chg="add del">
-          <ac:chgData name="Kelly Robertson" userId="1380f86364dddaff" providerId="LiveId" clId="{051780FD-A002-4E3C-A89D-4151B591C4AD}" dt="2022-12-07T00:13:44.532" v="1065" actId="700"/>
-          <ac:grpSpMkLst>
-            <pc:docMk/>
-            <pc:sldMk cId="1487700712" sldId="256"/>
-            <ac:grpSpMk id="17" creationId="{AA9EB0BC-A85E-4C26-B355-5DFCEF6CCB49}"/>
-          </ac:grpSpMkLst>
-        </pc:grpChg>
-        <pc:picChg chg="mod">
-          <ac:chgData name="Kelly Robertson" userId="1380f86364dddaff" providerId="LiveId" clId="{051780FD-A002-4E3C-A89D-4151B591C4AD}" dt="2022-12-07T00:06:11.146" v="1026" actId="1076"/>
-          <ac:picMkLst>
-            <pc:docMk/>
-            <pc:sldMk cId="1487700712" sldId="256"/>
-            <ac:picMk id="7" creationId="{3840F91C-EDD0-4D4E-A4AB-E6C77856C88C}"/>
-          </ac:picMkLst>
-        </pc:picChg>
-      </pc:sldChg>
-      <pc:sldChg chg="addSp delSp modSp mod modNotesTx">
-        <pc:chgData name="Kelly Robertson" userId="1380f86364dddaff" providerId="LiveId" clId="{051780FD-A002-4E3C-A89D-4151B591C4AD}" dt="2022-12-07T02:35:17.660" v="4148" actId="20577"/>
-        <pc:sldMkLst>
-          <pc:docMk/>
-          <pc:sldMk cId="497607547" sldId="258"/>
-        </pc:sldMkLst>
-        <pc:spChg chg="mod">
-          <ac:chgData name="Kelly Robertson" userId="1380f86364dddaff" providerId="LiveId" clId="{051780FD-A002-4E3C-A89D-4151B591C4AD}" dt="2022-12-07T02:10:54.789" v="3185" actId="403"/>
-          <ac:spMkLst>
-            <pc:docMk/>
-            <pc:sldMk cId="497607547" sldId="258"/>
-            <ac:spMk id="2" creationId="{921633EB-7DCB-4DDC-80AF-C885A3EE1245}"/>
-          </ac:spMkLst>
-        </pc:spChg>
-        <pc:spChg chg="add del mod">
-          <ac:chgData name="Kelly Robertson" userId="1380f86364dddaff" providerId="LiveId" clId="{051780FD-A002-4E3C-A89D-4151B591C4AD}" dt="2022-12-07T02:28:16.871" v="3744" actId="478"/>
-          <ac:spMkLst>
-            <pc:docMk/>
-            <pc:sldMk cId="497607547" sldId="258"/>
-            <ac:spMk id="4" creationId="{30607AE3-4632-4A2E-6C58-342F6426FA9A}"/>
-          </ac:spMkLst>
-        </pc:spChg>
-        <pc:spChg chg="add mod">
-          <ac:chgData name="Kelly Robertson" userId="1380f86364dddaff" providerId="LiveId" clId="{051780FD-A002-4E3C-A89D-4151B591C4AD}" dt="2022-12-07T02:28:32.807" v="3748" actId="14100"/>
-          <ac:spMkLst>
-            <pc:docMk/>
-            <pc:sldMk cId="497607547" sldId="258"/>
-            <ac:spMk id="5" creationId="{E396AA9C-F04F-223D-A3CA-1600D9F49DF7}"/>
-          </ac:spMkLst>
-        </pc:spChg>
-        <pc:spChg chg="add del mod">
-          <ac:chgData name="Kelly Robertson" userId="1380f86364dddaff" providerId="LiveId" clId="{051780FD-A002-4E3C-A89D-4151B591C4AD}" dt="2022-12-07T02:28:19.127" v="3745" actId="478"/>
-          <ac:spMkLst>
-            <pc:docMk/>
-            <pc:sldMk cId="497607547" sldId="258"/>
-            <ac:spMk id="7" creationId="{01AA0409-B7B3-1284-0817-50540EE196DD}"/>
-          </ac:spMkLst>
-        </pc:spChg>
-        <pc:spChg chg="add mod">
-          <ac:chgData name="Kelly Robertson" userId="1380f86364dddaff" providerId="LiveId" clId="{051780FD-A002-4E3C-A89D-4151B591C4AD}" dt="2022-12-07T02:35:17.660" v="4148" actId="20577"/>
-          <ac:spMkLst>
-            <pc:docMk/>
-            <pc:sldMk cId="497607547" sldId="258"/>
-            <ac:spMk id="8" creationId="{4D995767-E1F4-4DF6-BC87-6527F0EE7CF1}"/>
-          </ac:spMkLst>
-        </pc:spChg>
-        <pc:picChg chg="mod">
-          <ac:chgData name="Kelly Robertson" userId="1380f86364dddaff" providerId="LiveId" clId="{051780FD-A002-4E3C-A89D-4151B591C4AD}" dt="2022-12-07T00:07:25.209" v="1048"/>
-          <ac:picMkLst>
-            <pc:docMk/>
-            <pc:sldMk cId="497607547" sldId="258"/>
-            <ac:picMk id="11" creationId="{47D9BE16-119C-43B2-9AE6-18C4A150C0EF}"/>
-          </ac:picMkLst>
-        </pc:picChg>
-        <pc:picChg chg="del mod">
-          <ac:chgData name="Kelly Robertson" userId="1380f86364dddaff" providerId="LiveId" clId="{051780FD-A002-4E3C-A89D-4151B591C4AD}" dt="2022-12-07T02:10:58.387" v="3186" actId="478"/>
-          <ac:picMkLst>
-            <pc:docMk/>
-            <pc:sldMk cId="497607547" sldId="258"/>
-            <ac:picMk id="18" creationId="{BFEA8EC1-23A4-4843-A9C3-AE771D73392A}"/>
-          </ac:picMkLst>
-        </pc:picChg>
-      </pc:sldChg>
-      <pc:sldChg chg="addSp delSp del delDesignElem">
-        <pc:chgData name="Kelly Robertson" userId="1380f86364dddaff" providerId="LiveId" clId="{051780FD-A002-4E3C-A89D-4151B591C4AD}" dt="2022-12-07T02:11:58.411" v="3190" actId="47"/>
-        <pc:sldMkLst>
-          <pc:docMk/>
-          <pc:sldMk cId="4209322005" sldId="259"/>
-        </pc:sldMkLst>
-        <pc:spChg chg="add del">
-          <ac:chgData name="Kelly Robertson" userId="1380f86364dddaff" providerId="LiveId" clId="{051780FD-A002-4E3C-A89D-4151B591C4AD}" dt="2022-12-07T00:07:25.209" v="1048"/>
-          <ac:spMkLst>
-            <pc:docMk/>
-            <pc:sldMk cId="4209322005" sldId="259"/>
-            <ac:spMk id="13" creationId="{4AE9D071-98CF-435C-BD2B-976514544DC5}"/>
-          </ac:spMkLst>
-        </pc:spChg>
-        <pc:grpChg chg="add del">
-          <ac:chgData name="Kelly Robertson" userId="1380f86364dddaff" providerId="LiveId" clId="{051780FD-A002-4E3C-A89D-4151B591C4AD}" dt="2022-12-07T00:07:25.209" v="1048"/>
-          <ac:grpSpMkLst>
-            <pc:docMk/>
-            <pc:sldMk cId="4209322005" sldId="259"/>
-            <ac:grpSpMk id="15" creationId="{D619FC33-16ED-4246-9596-BEFEB55E4CF6}"/>
-          </ac:grpSpMkLst>
-        </pc:grpChg>
-      </pc:sldChg>
-      <pc:sldChg chg="addSp delSp modSp mod delDesignElem modNotesTx">
-        <pc:chgData name="Kelly Robertson" userId="1380f86364dddaff" providerId="LiveId" clId="{051780FD-A002-4E3C-A89D-4151B591C4AD}" dt="2022-12-09T01:02:10.015" v="4470" actId="20577"/>
-        <pc:sldMkLst>
-          <pc:docMk/>
-          <pc:sldMk cId="3501347425" sldId="260"/>
-        </pc:sldMkLst>
-        <pc:spChg chg="mod">
-          <ac:chgData name="Kelly Robertson" userId="1380f86364dddaff" providerId="LiveId" clId="{051780FD-A002-4E3C-A89D-4151B591C4AD}" dt="2022-12-07T02:16:48.387" v="3378" actId="20577"/>
-          <ac:spMkLst>
-            <pc:docMk/>
-            <pc:sldMk cId="3501347425" sldId="260"/>
-            <ac:spMk id="2" creationId="{0F87E73C-2B1A-4602-BFBE-CFE1E55D9B38}"/>
-          </ac:spMkLst>
-        </pc:spChg>
-        <pc:spChg chg="mod">
-          <ac:chgData name="Kelly Robertson" userId="1380f86364dddaff" providerId="LiveId" clId="{051780FD-A002-4E3C-A89D-4151B591C4AD}" dt="2022-12-09T01:02:10.015" v="4470" actId="20577"/>
-          <ac:spMkLst>
-            <pc:docMk/>
-            <pc:sldMk cId="3501347425" sldId="260"/>
-            <ac:spMk id="3" creationId="{A9CB511D-EA45-4336-847C-1252667143B5}"/>
-          </ac:spMkLst>
-        </pc:spChg>
-        <pc:spChg chg="add del">
-          <ac:chgData name="Kelly Robertson" userId="1380f86364dddaff" providerId="LiveId" clId="{051780FD-A002-4E3C-A89D-4151B591C4AD}" dt="2022-12-07T00:07:25.209" v="1048"/>
-          <ac:spMkLst>
-            <pc:docMk/>
-            <pc:sldMk cId="3501347425" sldId="260"/>
-            <ac:spMk id="10" creationId="{379F11E2-8BA5-4C5C-AE7C-361E5EA011FF}"/>
-          </ac:spMkLst>
-        </pc:spChg>
-        <pc:spChg chg="add del">
-          <ac:chgData name="Kelly Robertson" userId="1380f86364dddaff" providerId="LiveId" clId="{051780FD-A002-4E3C-A89D-4151B591C4AD}" dt="2022-12-07T00:07:25.209" v="1048"/>
-          <ac:spMkLst>
-            <pc:docMk/>
-            <pc:sldMk cId="3501347425" sldId="260"/>
-            <ac:spMk id="12" creationId="{7C00E1DA-EC7C-40FC-95E3-11FDCD2E4291}"/>
-          </ac:spMkLst>
-        </pc:spChg>
-        <pc:grpChg chg="add del">
-          <ac:chgData name="Kelly Robertson" userId="1380f86364dddaff" providerId="LiveId" clId="{051780FD-A002-4E3C-A89D-4151B591C4AD}" dt="2022-12-07T00:07:25.209" v="1048"/>
-          <ac:grpSpMkLst>
-            <pc:docMk/>
-            <pc:sldMk cId="3501347425" sldId="260"/>
-            <ac:grpSpMk id="14" creationId="{9A421166-2996-41A7-B094-AE5316F347DD}"/>
-          </ac:grpSpMkLst>
-        </pc:grpChg>
-        <pc:picChg chg="del">
-          <ac:chgData name="Kelly Robertson" userId="1380f86364dddaff" providerId="LiveId" clId="{051780FD-A002-4E3C-A89D-4151B591C4AD}" dt="2022-12-07T00:26:31.847" v="1158" actId="478"/>
-          <ac:picMkLst>
-            <pc:docMk/>
-            <pc:sldMk cId="3501347425" sldId="260"/>
-            <ac:picMk id="5" creationId="{A21EA617-6D48-425F-97A8-7FEC82C8F401}"/>
-          </ac:picMkLst>
-        </pc:picChg>
-        <pc:picChg chg="add mod">
-          <ac:chgData name="Kelly Robertson" userId="1380f86364dddaff" providerId="LiveId" clId="{051780FD-A002-4E3C-A89D-4151B591C4AD}" dt="2022-12-07T02:15:58.204" v="3330" actId="1076"/>
-          <ac:picMkLst>
-            <pc:docMk/>
-            <pc:sldMk cId="3501347425" sldId="260"/>
-            <ac:picMk id="6" creationId="{ADEE173D-31DC-389A-B5EC-519316A7966D}"/>
-          </ac:picMkLst>
-        </pc:picChg>
-        <pc:cxnChg chg="add mod">
-          <ac:chgData name="Kelly Robertson" userId="1380f86364dddaff" providerId="LiveId" clId="{051780FD-A002-4E3C-A89D-4151B591C4AD}" dt="2022-12-07T02:17:52.406" v="3406" actId="692"/>
-          <ac:cxnSpMkLst>
-            <pc:docMk/>
-            <pc:sldMk cId="3501347425" sldId="260"/>
-            <ac:cxnSpMk id="8" creationId="{C574F0ED-123D-53DD-8696-63DA79551BA5}"/>
-          </ac:cxnSpMkLst>
-        </pc:cxnChg>
-      </pc:sldChg>
-      <pc:sldChg chg="addSp delSp modSp mod delDesignElem modNotesTx">
-        <pc:chgData name="Kelly Robertson" userId="1380f86364dddaff" providerId="LiveId" clId="{051780FD-A002-4E3C-A89D-4151B591C4AD}" dt="2022-12-07T00:37:32.986" v="1327"/>
-        <pc:sldMkLst>
-          <pc:docMk/>
-          <pc:sldMk cId="1703342593" sldId="261"/>
-        </pc:sldMkLst>
-        <pc:spChg chg="mod">
-          <ac:chgData name="Kelly Robertson" userId="1380f86364dddaff" providerId="LiveId" clId="{051780FD-A002-4E3C-A89D-4151B591C4AD}" dt="2022-12-07T00:04:07.146" v="1023" actId="122"/>
-          <ac:spMkLst>
-            <pc:docMk/>
-            <pc:sldMk cId="1703342593" sldId="261"/>
-            <ac:spMk id="2" creationId="{5B040558-A365-4CCE-92FA-5A48CD98F9C9}"/>
-          </ac:spMkLst>
-        </pc:spChg>
-        <pc:spChg chg="add mod">
-          <ac:chgData name="Kelly Robertson" userId="1380f86364dddaff" providerId="LiveId" clId="{051780FD-A002-4E3C-A89D-4151B591C4AD}" dt="2022-12-07T00:21:43.270" v="1148" actId="14100"/>
-          <ac:spMkLst>
-            <pc:docMk/>
-            <pc:sldMk cId="1703342593" sldId="261"/>
-            <ac:spMk id="3" creationId="{2A726138-D455-48DB-973F-84F2C7720812}"/>
-          </ac:spMkLst>
-        </pc:spChg>
-        <pc:spChg chg="add mod">
-          <ac:chgData name="Kelly Robertson" userId="1380f86364dddaff" providerId="LiveId" clId="{051780FD-A002-4E3C-A89D-4151B591C4AD}" dt="2022-12-07T00:21:58.433" v="1157" actId="1076"/>
-          <ac:spMkLst>
-            <pc:docMk/>
-            <pc:sldMk cId="1703342593" sldId="261"/>
-            <ac:spMk id="5" creationId="{2DA6A05A-D31F-D59B-A3B4-31A0A6C636AB}"/>
-          </ac:spMkLst>
-        </pc:spChg>
-        <pc:spChg chg="add mod">
-          <ac:chgData name="Kelly Robertson" userId="1380f86364dddaff" providerId="LiveId" clId="{051780FD-A002-4E3C-A89D-4151B591C4AD}" dt="2022-12-05T23:39:09.643" v="261"/>
-          <ac:spMkLst>
-            <pc:docMk/>
-            <pc:sldMk cId="1703342593" sldId="261"/>
-            <ac:spMk id="6" creationId="{1173C32E-BC0F-EC77-255A-087080EA807E}"/>
-          </ac:spMkLst>
-        </pc:spChg>
-        <pc:spChg chg="add del">
-          <ac:chgData name="Kelly Robertson" userId="1380f86364dddaff" providerId="LiveId" clId="{051780FD-A002-4E3C-A89D-4151B591C4AD}" dt="2022-12-07T00:07:25.209" v="1048"/>
-          <ac:spMkLst>
-            <pc:docMk/>
-            <pc:sldMk cId="1703342593" sldId="261"/>
-            <ac:spMk id="29" creationId="{BFDA9692-ECDC-4B59-86B2-8C90FDE1A055}"/>
-          </ac:spMkLst>
-        </pc:spChg>
-        <pc:spChg chg="add del">
-          <ac:chgData name="Kelly Robertson" userId="1380f86364dddaff" providerId="LiveId" clId="{051780FD-A002-4E3C-A89D-4151B591C4AD}" dt="2022-12-07T00:07:25.209" v="1048"/>
-          <ac:spMkLst>
-            <pc:docMk/>
-            <pc:sldMk cId="1703342593" sldId="261"/>
-            <ac:spMk id="31" creationId="{12C05506-42A1-49C0-9D87-081CCD9023D6}"/>
-          </ac:spMkLst>
-        </pc:spChg>
-        <pc:graphicFrameChg chg="add mod">
-          <ac:chgData name="Kelly Robertson" userId="1380f86364dddaff" providerId="LiveId" clId="{051780FD-A002-4E3C-A89D-4151B591C4AD}" dt="2022-12-07T00:02:24.111" v="993"/>
-          <ac:graphicFrameMkLst>
-            <pc:docMk/>
-            <pc:sldMk cId="1703342593" sldId="261"/>
-            <ac:graphicFrameMk id="4" creationId="{81E592E1-99DF-4294-A2E9-EF46299BD3F4}"/>
-          </ac:graphicFrameMkLst>
-        </pc:graphicFrameChg>
-        <pc:picChg chg="add del">
-          <ac:chgData name="Kelly Robertson" userId="1380f86364dddaff" providerId="LiveId" clId="{051780FD-A002-4E3C-A89D-4151B591C4AD}" dt="2022-12-06T23:56:50.567" v="944" actId="478"/>
-          <ac:picMkLst>
-            <pc:docMk/>
-            <pc:sldMk cId="1703342593" sldId="261"/>
-            <ac:picMk id="7" creationId="{A8012F92-8EB3-921D-4F7E-469A21E6C0C3}"/>
-          </ac:picMkLst>
-        </pc:picChg>
-        <pc:picChg chg="add mod">
-          <ac:chgData name="Kelly Robertson" userId="1380f86364dddaff" providerId="LiveId" clId="{051780FD-A002-4E3C-A89D-4151B591C4AD}" dt="2022-12-07T00:00:41.443" v="967" actId="14100"/>
-          <ac:picMkLst>
-            <pc:docMk/>
-            <pc:sldMk cId="1703342593" sldId="261"/>
-            <ac:picMk id="9" creationId="{F72DABA6-90CD-B132-2C8F-61ABB2308A82}"/>
-          </ac:picMkLst>
-        </pc:picChg>
-        <pc:picChg chg="add del mod modCrop">
-          <ac:chgData name="Kelly Robertson" userId="1380f86364dddaff" providerId="LiveId" clId="{051780FD-A002-4E3C-A89D-4151B591C4AD}" dt="2022-12-07T00:01:24.090" v="969" actId="478"/>
-          <ac:picMkLst>
-            <pc:docMk/>
-            <pc:sldMk cId="1703342593" sldId="261"/>
-            <ac:picMk id="11" creationId="{AD501422-CB54-6355-661F-BB40E047A788}"/>
-          </ac:picMkLst>
-        </pc:picChg>
-        <pc:picChg chg="add mod">
-          <ac:chgData name="Kelly Robertson" userId="1380f86364dddaff" providerId="LiveId" clId="{051780FD-A002-4E3C-A89D-4151B591C4AD}" dt="2022-12-07T00:01:44.998" v="989" actId="1076"/>
-          <ac:picMkLst>
-            <pc:docMk/>
-            <pc:sldMk cId="1703342593" sldId="261"/>
-            <ac:picMk id="13" creationId="{9917A4FE-CFA8-F0D1-7C86-7DAF924243D8}"/>
-          </ac:picMkLst>
-        </pc:picChg>
-      </pc:sldChg>
-      <pc:sldChg chg="addSp delSp modSp mod ord setBg modNotesTx">
-        <pc:chgData name="Kelly Robertson" userId="1380f86364dddaff" providerId="LiveId" clId="{051780FD-A002-4E3C-A89D-4151B591C4AD}" dt="2022-12-07T02:43:33.279" v="4385"/>
-        <pc:sldMkLst>
-          <pc:docMk/>
-          <pc:sldMk cId="3699450192" sldId="262"/>
-        </pc:sldMkLst>
-        <pc:spChg chg="add del mod">
-          <ac:chgData name="Kelly Robertson" userId="1380f86364dddaff" providerId="LiveId" clId="{051780FD-A002-4E3C-A89D-4151B591C4AD}" dt="2022-12-07T00:47:35.542" v="1470" actId="478"/>
-          <ac:spMkLst>
-            <pc:docMk/>
-            <pc:sldMk cId="3699450192" sldId="262"/>
-            <ac:spMk id="2" creationId="{D77B5800-0B5A-8E07-2F4A-050CC76CCA39}"/>
-          </ac:spMkLst>
-        </pc:spChg>
-        <pc:spChg chg="add del mod">
-          <ac:chgData name="Kelly Robertson" userId="1380f86364dddaff" providerId="LiveId" clId="{051780FD-A002-4E3C-A89D-4151B591C4AD}" dt="2022-12-07T00:51:08.483" v="1533" actId="478"/>
-          <ac:spMkLst>
-            <pc:docMk/>
-            <pc:sldMk cId="3699450192" sldId="262"/>
-            <ac:spMk id="3" creationId="{9484D06F-3982-6A02-7BF8-DCD855600342}"/>
-          </ac:spMkLst>
-        </pc:spChg>
-        <pc:spChg chg="add del mod">
-          <ac:chgData name="Kelly Robertson" userId="1380f86364dddaff" providerId="LiveId" clId="{051780FD-A002-4E3C-A89D-4151B591C4AD}" dt="2022-12-07T00:51:08.483" v="1533" actId="478"/>
-          <ac:spMkLst>
-            <pc:docMk/>
-            <pc:sldMk cId="3699450192" sldId="262"/>
-            <ac:spMk id="4" creationId="{12CF024D-B547-B192-55A2-6FF5D0E19C8F}"/>
-          </ac:spMkLst>
-        </pc:spChg>
-        <pc:spChg chg="add del mod">
-          <ac:chgData name="Kelly Robertson" userId="1380f86364dddaff" providerId="LiveId" clId="{051780FD-A002-4E3C-A89D-4151B591C4AD}" dt="2022-12-07T00:51:08.483" v="1533" actId="478"/>
-          <ac:spMkLst>
-            <pc:docMk/>
-            <pc:sldMk cId="3699450192" sldId="262"/>
-            <ac:spMk id="5" creationId="{00EA4AA5-18F1-32CD-C58D-BF1E2E4C6658}"/>
-          </ac:spMkLst>
-        </pc:spChg>
-        <pc:spChg chg="mod">
-          <ac:chgData name="Kelly Robertson" userId="1380f86364dddaff" providerId="LiveId" clId="{051780FD-A002-4E3C-A89D-4151B591C4AD}" dt="2022-12-07T02:38:35.093" v="4239" actId="14100"/>
-          <ac:spMkLst>
-            <pc:docMk/>
-            <pc:sldMk cId="3699450192" sldId="262"/>
-            <ac:spMk id="7" creationId="{A6872FD2-C908-6FD1-117A-8E62AC1199FD}"/>
-          </ac:spMkLst>
-        </pc:spChg>
-        <pc:spChg chg="add del mod">
-          <ac:chgData name="Kelly Robertson" userId="1380f86364dddaff" providerId="LiveId" clId="{051780FD-A002-4E3C-A89D-4151B591C4AD}" dt="2022-12-07T00:51:08.483" v="1533" actId="478"/>
-          <ac:spMkLst>
-            <pc:docMk/>
-            <pc:sldMk cId="3699450192" sldId="262"/>
-            <ac:spMk id="8" creationId="{F2395135-C149-9662-8C08-6D2FC919F3B0}"/>
-          </ac:spMkLst>
-        </pc:spChg>
-        <pc:spChg chg="add del mod">
-          <ac:chgData name="Kelly Robertson" userId="1380f86364dddaff" providerId="LiveId" clId="{051780FD-A002-4E3C-A89D-4151B591C4AD}" dt="2022-12-07T00:51:09.962" v="1534" actId="478"/>
-          <ac:spMkLst>
-            <pc:docMk/>
-            <pc:sldMk cId="3699450192" sldId="262"/>
-            <ac:spMk id="9" creationId="{A86CC1A3-8D41-2BFC-B3BD-40526022AA69}"/>
-          </ac:spMkLst>
-        </pc:spChg>
-        <pc:spChg chg="add del mod">
-          <ac:chgData name="Kelly Robertson" userId="1380f86364dddaff" providerId="LiveId" clId="{051780FD-A002-4E3C-A89D-4151B591C4AD}" dt="2022-12-07T00:51:11.569" v="1535" actId="478"/>
-          <ac:spMkLst>
-            <pc:docMk/>
-            <pc:sldMk cId="3699450192" sldId="262"/>
-            <ac:spMk id="10" creationId="{3B16C27B-F114-EF46-45C4-B011CC4A662F}"/>
-          </ac:spMkLst>
-        </pc:spChg>
-        <pc:spChg chg="add del mod">
-          <ac:chgData name="Kelly Robertson" userId="1380f86364dddaff" providerId="LiveId" clId="{051780FD-A002-4E3C-A89D-4151B591C4AD}" dt="2022-12-07T00:51:08.483" v="1533" actId="478"/>
-          <ac:spMkLst>
-            <pc:docMk/>
-            <pc:sldMk cId="3699450192" sldId="262"/>
-            <ac:spMk id="11" creationId="{91A520B2-B82D-14DA-AB27-3C5CBD505A23}"/>
-          </ac:spMkLst>
-        </pc:spChg>
-        <pc:spChg chg="add del mod">
-          <ac:chgData name="Kelly Robertson" userId="1380f86364dddaff" providerId="LiveId" clId="{051780FD-A002-4E3C-A89D-4151B591C4AD}" dt="2022-12-07T00:51:08.483" v="1533" actId="478"/>
-          <ac:spMkLst>
-            <pc:docMk/>
-            <pc:sldMk cId="3699450192" sldId="262"/>
-            <ac:spMk id="12" creationId="{6B051849-3460-D3C9-5547-82560B6A51A1}"/>
-          </ac:spMkLst>
-        </pc:spChg>
-        <pc:spChg chg="add del mod">
-          <ac:chgData name="Kelly Robertson" userId="1380f86364dddaff" providerId="LiveId" clId="{051780FD-A002-4E3C-A89D-4151B591C4AD}" dt="2022-12-07T02:04:14.641" v="2995" actId="478"/>
-          <ac:spMkLst>
-            <pc:docMk/>
-            <pc:sldMk cId="3699450192" sldId="262"/>
-            <ac:spMk id="13" creationId="{EF816DCD-1761-FA84-8622-8CD7EECDE171}"/>
-          </ac:spMkLst>
-        </pc:spChg>
-        <pc:spChg chg="add mod">
-          <ac:chgData name="Kelly Robertson" userId="1380f86364dddaff" providerId="LiveId" clId="{051780FD-A002-4E3C-A89D-4151B591C4AD}" dt="2022-12-07T02:04:09.942" v="2994" actId="1038"/>
-          <ac:spMkLst>
-            <pc:docMk/>
-            <pc:sldMk cId="3699450192" sldId="262"/>
-            <ac:spMk id="14" creationId="{10AEDDAC-0689-8347-CA9C-B8BC9EA65694}"/>
-          </ac:spMkLst>
-        </pc:spChg>
-        <pc:spChg chg="add mod">
-          <ac:chgData name="Kelly Robertson" userId="1380f86364dddaff" providerId="LiveId" clId="{051780FD-A002-4E3C-A89D-4151B591C4AD}" dt="2022-12-07T02:03:54.317" v="2915" actId="1035"/>
-          <ac:spMkLst>
-            <pc:docMk/>
-            <pc:sldMk cId="3699450192" sldId="262"/>
-            <ac:spMk id="15" creationId="{F56D0EDB-DB9E-98F4-6D86-6BD18C8B0B09}"/>
-          </ac:spMkLst>
-        </pc:spChg>
-        <pc:spChg chg="add mod">
-          <ac:chgData name="Kelly Robertson" userId="1380f86364dddaff" providerId="LiveId" clId="{051780FD-A002-4E3C-A89D-4151B591C4AD}" dt="2022-12-07T02:03:38.226" v="2832" actId="1036"/>
-          <ac:spMkLst>
-            <pc:docMk/>
-            <pc:sldMk cId="3699450192" sldId="262"/>
-            <ac:spMk id="16" creationId="{7CE44404-9B26-C317-E776-9384B876B920}"/>
-          </ac:spMkLst>
-        </pc:spChg>
-        <pc:spChg chg="add mod">
-          <ac:chgData name="Kelly Robertson" userId="1380f86364dddaff" providerId="LiveId" clId="{051780FD-A002-4E3C-A89D-4151B591C4AD}" dt="2022-12-07T02:03:46.782" v="2873" actId="1037"/>
-          <ac:spMkLst>
-            <pc:docMk/>
-            <pc:sldMk cId="3699450192" sldId="262"/>
-            <ac:spMk id="17" creationId="{2C72D88D-A75B-2FF7-4D15-677C2ED85B2E}"/>
-          </ac:spMkLst>
-        </pc:spChg>
-        <pc:spChg chg="add mod">
-          <ac:chgData name="Kelly Robertson" userId="1380f86364dddaff" providerId="LiveId" clId="{051780FD-A002-4E3C-A89D-4151B591C4AD}" dt="2022-12-07T02:04:37.779" v="3028" actId="108"/>
-          <ac:spMkLst>
-            <pc:docMk/>
-            <pc:sldMk cId="3699450192" sldId="262"/>
-            <ac:spMk id="18" creationId="{BEECC2C4-F69A-4FA7-0D17-77E0108D8E18}"/>
-          </ac:spMkLst>
-        </pc:spChg>
-        <pc:spChg chg="add mod">
-          <ac:chgData name="Kelly Robertson" userId="1380f86364dddaff" providerId="LiveId" clId="{051780FD-A002-4E3C-A89D-4151B591C4AD}" dt="2022-12-07T02:04:39.925" v="3029" actId="108"/>
-          <ac:spMkLst>
-            <pc:docMk/>
-            <pc:sldMk cId="3699450192" sldId="262"/>
-            <ac:spMk id="19" creationId="{009BCDC6-8242-9861-36C6-BE122FECCF57}"/>
-          </ac:spMkLst>
-        </pc:spChg>
-        <pc:spChg chg="add mod">
-          <ac:chgData name="Kelly Robertson" userId="1380f86364dddaff" providerId="LiveId" clId="{051780FD-A002-4E3C-A89D-4151B591C4AD}" dt="2022-12-07T02:02:22.605" v="2547" actId="1036"/>
-          <ac:spMkLst>
-            <pc:docMk/>
-            <pc:sldMk cId="3699450192" sldId="262"/>
-            <ac:spMk id="20" creationId="{558FCF4D-4BA6-3AE5-9817-04A5D6F447E1}"/>
-          </ac:spMkLst>
-        </pc:spChg>
-        <pc:spChg chg="add mod">
-          <ac:chgData name="Kelly Robertson" userId="1380f86364dddaff" providerId="LiveId" clId="{051780FD-A002-4E3C-A89D-4151B591C4AD}" dt="2022-12-07T02:04:46.778" v="3030" actId="13822"/>
-          <ac:spMkLst>
-            <pc:docMk/>
-            <pc:sldMk cId="3699450192" sldId="262"/>
-            <ac:spMk id="21" creationId="{3A5EFE3F-AE8B-FBBC-9BFC-9C4E1DD5AB0F}"/>
-          </ac:spMkLst>
-        </pc:spChg>
-        <pc:spChg chg="add mod">
-          <ac:chgData name="Kelly Robertson" userId="1380f86364dddaff" providerId="LiveId" clId="{051780FD-A002-4E3C-A89D-4151B591C4AD}" dt="2022-12-07T02:04:50.112" v="3031" actId="108"/>
-          <ac:spMkLst>
-            <pc:docMk/>
-            <pc:sldMk cId="3699450192" sldId="262"/>
-            <ac:spMk id="22" creationId="{AC42912C-ACD5-5DDE-285D-73DA592B21DC}"/>
-          </ac:spMkLst>
-        </pc:spChg>
-        <pc:spChg chg="add mod">
-          <ac:chgData name="Kelly Robertson" userId="1380f86364dddaff" providerId="LiveId" clId="{051780FD-A002-4E3C-A89D-4151B591C4AD}" dt="2022-12-07T02:04:51.782" v="3032" actId="108"/>
-          <ac:spMkLst>
-            <pc:docMk/>
-            <pc:sldMk cId="3699450192" sldId="262"/>
-            <ac:spMk id="23" creationId="{83F702BC-54AE-5775-6457-E51B15A44ECF}"/>
-          </ac:spMkLst>
-        </pc:spChg>
-        <pc:spChg chg="add mod">
-          <ac:chgData name="Kelly Robertson" userId="1380f86364dddaff" providerId="LiveId" clId="{051780FD-A002-4E3C-A89D-4151B591C4AD}" dt="2022-12-07T02:06:09.622" v="3114" actId="207"/>
-          <ac:spMkLst>
-            <pc:docMk/>
-            <pc:sldMk cId="3699450192" sldId="262"/>
-            <ac:spMk id="24" creationId="{AFB18D7C-79B8-3CAC-0702-F783D3896DE2}"/>
-          </ac:spMkLst>
-        </pc:spChg>
-        <pc:spChg chg="add mod">
-          <ac:chgData name="Kelly Robertson" userId="1380f86364dddaff" providerId="LiveId" clId="{051780FD-A002-4E3C-A89D-4151B591C4AD}" dt="2022-12-07T02:07:21.155" v="3132" actId="20577"/>
-          <ac:spMkLst>
-            <pc:docMk/>
-            <pc:sldMk cId="3699450192" sldId="262"/>
-            <ac:spMk id="25" creationId="{EDA64709-D4C3-B8DF-3EC6-E223B724B56A}"/>
-          </ac:spMkLst>
-        </pc:spChg>
-        <pc:spChg chg="add mod">
-          <ac:chgData name="Kelly Robertson" userId="1380f86364dddaff" providerId="LiveId" clId="{051780FD-A002-4E3C-A89D-4151B591C4AD}" dt="2022-12-07T02:06:51.058" v="3126" actId="20577"/>
-          <ac:spMkLst>
-            <pc:docMk/>
-            <pc:sldMk cId="3699450192" sldId="262"/>
-            <ac:spMk id="26" creationId="{840CDD88-4ED0-0346-823C-C5B2E2ECB4E7}"/>
-          </ac:spMkLst>
-        </pc:spChg>
-        <pc:spChg chg="add mod">
-          <ac:chgData name="Kelly Robertson" userId="1380f86364dddaff" providerId="LiveId" clId="{051780FD-A002-4E3C-A89D-4151B591C4AD}" dt="2022-12-07T02:39:43.366" v="4264" actId="1038"/>
-          <ac:spMkLst>
-            <pc:docMk/>
-            <pc:sldMk cId="3699450192" sldId="262"/>
-            <ac:spMk id="27" creationId="{086D8493-BBC1-19DD-0FF1-E0C9371AFDCB}"/>
-          </ac:spMkLst>
-        </pc:spChg>
-        <pc:spChg chg="add mod">
-          <ac:chgData name="Kelly Robertson" userId="1380f86364dddaff" providerId="LiveId" clId="{051780FD-A002-4E3C-A89D-4151B591C4AD}" dt="2022-12-07T02:39:43.366" v="4264" actId="1038"/>
-          <ac:spMkLst>
-            <pc:docMk/>
-            <pc:sldMk cId="3699450192" sldId="262"/>
-            <ac:spMk id="28" creationId="{239B0370-139B-9828-174F-C58CBBEDAEC5}"/>
-          </ac:spMkLst>
-        </pc:spChg>
-        <pc:spChg chg="add mod">
-          <ac:chgData name="Kelly Robertson" userId="1380f86364dddaff" providerId="LiveId" clId="{051780FD-A002-4E3C-A89D-4151B591C4AD}" dt="2022-12-07T02:39:43.366" v="4264" actId="1038"/>
-          <ac:spMkLst>
-            <pc:docMk/>
-            <pc:sldMk cId="3699450192" sldId="262"/>
-            <ac:spMk id="29" creationId="{FCC747B0-DF4B-294B-E378-14CD0C0E0D9C}"/>
-          </ac:spMkLst>
-        </pc:spChg>
-        <pc:spChg chg="add mod">
-          <ac:chgData name="Kelly Robertson" userId="1380f86364dddaff" providerId="LiveId" clId="{051780FD-A002-4E3C-A89D-4151B591C4AD}" dt="2022-12-07T02:42:27.860" v="4378" actId="14100"/>
-          <ac:spMkLst>
-            <pc:docMk/>
-            <pc:sldMk cId="3699450192" sldId="262"/>
-            <ac:spMk id="30" creationId="{A33FB2E3-1754-7728-F81C-87630C1F206E}"/>
-          </ac:spMkLst>
-        </pc:spChg>
-        <pc:spChg chg="add mod ord">
-          <ac:chgData name="Kelly Robertson" userId="1380f86364dddaff" providerId="LiveId" clId="{051780FD-A002-4E3C-A89D-4151B591C4AD}" dt="2022-12-07T02:43:33.279" v="4385"/>
-          <ac:spMkLst>
-            <pc:docMk/>
-            <pc:sldMk cId="3699450192" sldId="262"/>
-            <ac:spMk id="31" creationId="{162B691B-6B9F-F39D-BE51-7A404B07683A}"/>
-          </ac:spMkLst>
-        </pc:spChg>
-        <pc:picChg chg="mod">
-          <ac:chgData name="Kelly Robertson" userId="1380f86364dddaff" providerId="LiveId" clId="{051780FD-A002-4E3C-A89D-4151B591C4AD}" dt="2022-12-07T02:00:26.639" v="1733" actId="1076"/>
-          <ac:picMkLst>
-            <pc:docMk/>
-            <pc:sldMk cId="3699450192" sldId="262"/>
-            <ac:picMk id="6" creationId="{0A5DB2F1-A9A1-921F-F5C9-615AACDACACE}"/>
-          </ac:picMkLst>
-        </pc:picChg>
-      </pc:sldChg>
-      <pc:sldChg chg="modSp new mod modNotesTx">
-        <pc:chgData name="Kelly Robertson" userId="1380f86364dddaff" providerId="LiveId" clId="{051780FD-A002-4E3C-A89D-4151B591C4AD}" dt="2022-12-07T02:09:05.827" v="3166" actId="108"/>
-        <pc:sldMkLst>
-          <pc:docMk/>
-          <pc:sldMk cId="2346233721" sldId="263"/>
-        </pc:sldMkLst>
-        <pc:spChg chg="mod">
-          <ac:chgData name="Kelly Robertson" userId="1380f86364dddaff" providerId="LiveId" clId="{051780FD-A002-4E3C-A89D-4151B591C4AD}" dt="2022-12-07T02:09:05.827" v="3166" actId="108"/>
-          <ac:spMkLst>
-            <pc:docMk/>
-            <pc:sldMk cId="2346233721" sldId="263"/>
-            <ac:spMk id="2" creationId="{E1203C47-35CE-D4BD-7532-DB2EA12343AA}"/>
-          </ac:spMkLst>
-        </pc:spChg>
-        <pc:spChg chg="mod">
-          <ac:chgData name="Kelly Robertson" userId="1380f86364dddaff" providerId="LiveId" clId="{051780FD-A002-4E3C-A89D-4151B591C4AD}" dt="2022-12-07T02:08:11.004" v="3137" actId="20577"/>
-          <ac:spMkLst>
-            <pc:docMk/>
-            <pc:sldMk cId="2346233721" sldId="263"/>
-            <ac:spMk id="3" creationId="{ADAA82AA-92AA-233E-633B-3C6387E45D5E}"/>
-          </ac:spMkLst>
-        </pc:spChg>
-        <pc:spChg chg="mod">
-          <ac:chgData name="Kelly Robertson" userId="1380f86364dddaff" providerId="LiveId" clId="{051780FD-A002-4E3C-A89D-4151B591C4AD}" dt="2022-12-07T02:07:54.296" v="3133" actId="403"/>
-          <ac:spMkLst>
-            <pc:docMk/>
-            <pc:sldMk cId="2346233721" sldId="263"/>
-            <ac:spMk id="4" creationId="{5F794FE3-59EA-6B2F-A563-5DB69DE1425C}"/>
-          </ac:spMkLst>
-        </pc:spChg>
-      </pc:sldChg>
-      <pc:sldChg chg="addSp modSp new mod modNotesTx">
-        <pc:chgData name="Kelly Robertson" userId="1380f86364dddaff" providerId="LiveId" clId="{051780FD-A002-4E3C-A89D-4151B591C4AD}" dt="2022-12-09T00:42:18.387" v="4411" actId="20577"/>
-        <pc:sldMkLst>
-          <pc:docMk/>
-          <pc:sldMk cId="263900212" sldId="264"/>
-        </pc:sldMkLst>
-        <pc:spChg chg="mod">
-          <ac:chgData name="Kelly Robertson" userId="1380f86364dddaff" providerId="LiveId" clId="{051780FD-A002-4E3C-A89D-4151B591C4AD}" dt="2022-12-07T02:22:27.855" v="3536" actId="20577"/>
-          <ac:spMkLst>
-            <pc:docMk/>
-            <pc:sldMk cId="263900212" sldId="264"/>
-            <ac:spMk id="2" creationId="{E1825556-A7C8-AE21-4BD3-F77DE3F04E56}"/>
-          </ac:spMkLst>
-        </pc:spChg>
-        <pc:spChg chg="mod">
-          <ac:chgData name="Kelly Robertson" userId="1380f86364dddaff" providerId="LiveId" clId="{051780FD-A002-4E3C-A89D-4151B591C4AD}" dt="2022-12-05T23:58:56.018" v="928" actId="122"/>
-          <ac:spMkLst>
-            <pc:docMk/>
-            <pc:sldMk cId="263900212" sldId="264"/>
-            <ac:spMk id="3" creationId="{4C83CFC2-E02B-82EA-BAE0-0E234A9AFB00}"/>
-          </ac:spMkLst>
-        </pc:spChg>
-        <pc:spChg chg="add mod">
-          <ac:chgData name="Kelly Robertson" userId="1380f86364dddaff" providerId="LiveId" clId="{051780FD-A002-4E3C-A89D-4151B591C4AD}" dt="2022-12-09T00:42:18.387" v="4411" actId="20577"/>
-          <ac:spMkLst>
-            <pc:docMk/>
-            <pc:sldMk cId="263900212" sldId="264"/>
-            <ac:spMk id="5" creationId="{0EF5C6E2-2CBA-3F4C-926F-5E17CCEBF0A2}"/>
-          </ac:spMkLst>
-        </pc:spChg>
-        <pc:graphicFrameChg chg="add mod modGraphic">
-          <ac:chgData name="Kelly Robertson" userId="1380f86364dddaff" providerId="LiveId" clId="{051780FD-A002-4E3C-A89D-4151B591C4AD}" dt="2022-12-07T00:21:05.694" v="1143"/>
-          <ac:graphicFrameMkLst>
-            <pc:docMk/>
-            <pc:sldMk cId="263900212" sldId="264"/>
-            <ac:graphicFrameMk id="4" creationId="{681A7A07-BB20-6532-DE48-9AF3D721FD6E}"/>
-          </ac:graphicFrameMkLst>
-        </pc:graphicFrameChg>
-      </pc:sldChg>
-      <pc:sldChg chg="addSp delSp modSp new mod">
-        <pc:chgData name="Kelly Robertson" userId="1380f86364dddaff" providerId="LiveId" clId="{051780FD-A002-4E3C-A89D-4151B591C4AD}" dt="2022-12-09T01:02:49.434" v="4472" actId="1076"/>
-        <pc:sldMkLst>
-          <pc:docMk/>
-          <pc:sldMk cId="1834657414" sldId="265"/>
-        </pc:sldMkLst>
-        <pc:picChg chg="add mod">
-          <ac:chgData name="Kelly Robertson" userId="1380f86364dddaff" providerId="LiveId" clId="{051780FD-A002-4E3C-A89D-4151B591C4AD}" dt="2022-12-09T01:02:49.434" v="4472" actId="1076"/>
-          <ac:picMkLst>
-            <pc:docMk/>
-            <pc:sldMk cId="1834657414" sldId="265"/>
-            <ac:picMk id="2" creationId="{CAC86E23-3A39-1B02-703D-E8B27B7AAB14}"/>
-          </ac:picMkLst>
-        </pc:picChg>
-        <pc:picChg chg="add mod">
-          <ac:chgData name="Kelly Robertson" userId="1380f86364dddaff" providerId="LiveId" clId="{051780FD-A002-4E3C-A89D-4151B591C4AD}" dt="2022-12-07T00:36:37.978" v="1324" actId="14100"/>
-          <ac:picMkLst>
-            <pc:docMk/>
-            <pc:sldMk cId="1834657414" sldId="265"/>
-            <ac:picMk id="3" creationId="{B9F0714F-E3C0-C13E-696D-231AEE5A4817}"/>
-          </ac:picMkLst>
-        </pc:picChg>
-        <pc:picChg chg="add mod">
-          <ac:chgData name="Kelly Robertson" userId="1380f86364dddaff" providerId="LiveId" clId="{051780FD-A002-4E3C-A89D-4151B591C4AD}" dt="2022-12-07T02:20:55.444" v="3471" actId="1036"/>
-          <ac:picMkLst>
-            <pc:docMk/>
-            <pc:sldMk cId="1834657414" sldId="265"/>
-            <ac:picMk id="5" creationId="{58CDEFEE-A685-ABD4-3BCE-81BCD4EE0349}"/>
-          </ac:picMkLst>
-        </pc:picChg>
-        <pc:picChg chg="add mod">
-          <ac:chgData name="Kelly Robertson" userId="1380f86364dddaff" providerId="LiveId" clId="{051780FD-A002-4E3C-A89D-4151B591C4AD}" dt="2022-12-07T02:20:55.444" v="3471" actId="1036"/>
-          <ac:picMkLst>
-            <pc:docMk/>
-            <pc:sldMk cId="1834657414" sldId="265"/>
-            <ac:picMk id="6" creationId="{E6DB23C1-CF91-D4DD-7154-48A217F5B56A}"/>
-          </ac:picMkLst>
-        </pc:picChg>
-        <pc:picChg chg="add mod">
-          <ac:chgData name="Kelly Robertson" userId="1380f86364dddaff" providerId="LiveId" clId="{051780FD-A002-4E3C-A89D-4151B591C4AD}" dt="2022-12-07T02:20:55.444" v="3471" actId="1036"/>
-          <ac:picMkLst>
-            <pc:docMk/>
-            <pc:sldMk cId="1834657414" sldId="265"/>
-            <ac:picMk id="7" creationId="{1E67BE38-959F-9330-45E9-36002E87B1CE}"/>
-          </ac:picMkLst>
-        </pc:picChg>
-        <pc:picChg chg="add mod">
-          <ac:chgData name="Kelly Robertson" userId="1380f86364dddaff" providerId="LiveId" clId="{051780FD-A002-4E3C-A89D-4151B591C4AD}" dt="2022-12-07T02:20:55.444" v="3471" actId="1036"/>
-          <ac:picMkLst>
-            <pc:docMk/>
-            <pc:sldMk cId="1834657414" sldId="265"/>
-            <ac:picMk id="8" creationId="{B26E9DD1-29FC-B5FD-BFBE-7D5D166D3E6D}"/>
-          </ac:picMkLst>
-        </pc:picChg>
-        <pc:picChg chg="add mod">
-          <ac:chgData name="Kelly Robertson" userId="1380f86364dddaff" providerId="LiveId" clId="{051780FD-A002-4E3C-A89D-4151B591C4AD}" dt="2022-12-07T02:20:55.444" v="3471" actId="1036"/>
-          <ac:picMkLst>
-            <pc:docMk/>
-            <pc:sldMk cId="1834657414" sldId="265"/>
-            <ac:picMk id="9" creationId="{C63325D9-712D-B4C5-1143-D6FDDF770A79}"/>
-          </ac:picMkLst>
-        </pc:picChg>
-        <pc:picChg chg="add del mod">
-          <ac:chgData name="Kelly Robertson" userId="1380f86364dddaff" providerId="LiveId" clId="{051780FD-A002-4E3C-A89D-4151B591C4AD}" dt="2022-12-07T02:24:03.110" v="3568" actId="478"/>
-          <ac:picMkLst>
-            <pc:docMk/>
-            <pc:sldMk cId="1834657414" sldId="265"/>
-            <ac:picMk id="10" creationId="{C1FED1C2-C582-6906-DC06-28F08E405350}"/>
-          </ac:picMkLst>
-        </pc:picChg>
-        <pc:picChg chg="add mod">
-          <ac:chgData name="Kelly Robertson" userId="1380f86364dddaff" providerId="LiveId" clId="{051780FD-A002-4E3C-A89D-4151B591C4AD}" dt="2022-12-07T02:34:24.282" v="4096" actId="1076"/>
-          <ac:picMkLst>
-            <pc:docMk/>
-            <pc:sldMk cId="1834657414" sldId="265"/>
-            <ac:picMk id="11" creationId="{08833AC6-53DA-1ACF-EFC3-C7FB6656776E}"/>
-          </ac:picMkLst>
-        </pc:picChg>
-      </pc:sldChg>
-      <pc:sldChg chg="addSp delSp modSp new mod modNotesTx">
-        <pc:chgData name="Kelly Robertson" userId="1380f86364dddaff" providerId="LiveId" clId="{051780FD-A002-4E3C-A89D-4151B591C4AD}" dt="2022-12-10T23:45:21.988" v="4717" actId="1076"/>
-        <pc:sldMkLst>
-          <pc:docMk/>
-          <pc:sldMk cId="1856399602" sldId="266"/>
-        </pc:sldMkLst>
-        <pc:spChg chg="mod">
-          <ac:chgData name="Kelly Robertson" userId="1380f86364dddaff" providerId="LiveId" clId="{051780FD-A002-4E3C-A89D-4151B591C4AD}" dt="2022-12-07T02:09:58.360" v="3171" actId="2711"/>
-          <ac:spMkLst>
-            <pc:docMk/>
-            <pc:sldMk cId="1856399602" sldId="266"/>
-            <ac:spMk id="2" creationId="{E16FFAEA-5151-81FE-BB25-A0FFC2452FC1}"/>
-          </ac:spMkLst>
-        </pc:spChg>
-        <pc:spChg chg="add mod">
-          <ac:chgData name="Kelly Robertson" userId="1380f86364dddaff" providerId="LiveId" clId="{051780FD-A002-4E3C-A89D-4151B591C4AD}" dt="2022-12-10T23:45:21.988" v="4717" actId="1076"/>
-          <ac:spMkLst>
-            <pc:docMk/>
-            <pc:sldMk cId="1856399602" sldId="266"/>
-            <ac:spMk id="11" creationId="{7B4535EB-2E90-EA64-757A-C8AD5E9CB07C}"/>
-          </ac:spMkLst>
-        </pc:spChg>
-        <pc:spChg chg="add del mod">
-          <ac:chgData name="Kelly Robertson" userId="1380f86364dddaff" providerId="LiveId" clId="{051780FD-A002-4E3C-A89D-4151B591C4AD}" dt="2022-12-10T23:31:18.748" v="4478" actId="478"/>
-          <ac:spMkLst>
-            <pc:docMk/>
-            <pc:sldMk cId="1856399602" sldId="266"/>
-            <ac:spMk id="13" creationId="{7100B8C2-41DF-C84E-E218-C5D699B1ED09}"/>
-          </ac:spMkLst>
-        </pc:spChg>
-        <pc:spChg chg="add del mod">
-          <ac:chgData name="Kelly Robertson" userId="1380f86364dddaff" providerId="LiveId" clId="{051780FD-A002-4E3C-A89D-4151B591C4AD}" dt="2022-12-10T23:31:31.283" v="4495" actId="478"/>
-          <ac:spMkLst>
-            <pc:docMk/>
-            <pc:sldMk cId="1856399602" sldId="266"/>
-            <ac:spMk id="14" creationId="{8A50FECF-DEB2-7D89-F19D-7771BDC7F23A}"/>
-          </ac:spMkLst>
-        </pc:spChg>
-        <pc:spChg chg="add del mod">
-          <ac:chgData name="Kelly Robertson" userId="1380f86364dddaff" providerId="LiveId" clId="{051780FD-A002-4E3C-A89D-4151B591C4AD}" dt="2022-12-10T23:31:32.888" v="4496" actId="478"/>
-          <ac:spMkLst>
-            <pc:docMk/>
-            <pc:sldMk cId="1856399602" sldId="266"/>
-            <ac:spMk id="15" creationId="{4A932278-D4B3-E501-2AD1-8746008B4808}"/>
-          </ac:spMkLst>
-        </pc:spChg>
-        <pc:spChg chg="add mod">
-          <ac:chgData name="Kelly Robertson" userId="1380f86364dddaff" providerId="LiveId" clId="{051780FD-A002-4E3C-A89D-4151B591C4AD}" dt="2022-12-10T23:31:28.158" v="4494" actId="20577"/>
-          <ac:spMkLst>
-            <pc:docMk/>
-            <pc:sldMk cId="1856399602" sldId="266"/>
-            <ac:spMk id="16" creationId="{95A612CD-EB35-2FB1-48FC-EC3F1B389F04}"/>
-          </ac:spMkLst>
-        </pc:spChg>
-        <pc:picChg chg="add del mod">
-          <ac:chgData name="Kelly Robertson" userId="1380f86364dddaff" providerId="LiveId" clId="{051780FD-A002-4E3C-A89D-4151B591C4AD}" dt="2022-12-07T01:52:13.847" v="1552" actId="21"/>
-          <ac:picMkLst>
-            <pc:docMk/>
-            <pc:sldMk cId="1856399602" sldId="266"/>
-            <ac:picMk id="4" creationId="{3D329FC8-62E2-E6D4-9BBD-420722DAEC43}"/>
-          </ac:picMkLst>
-        </pc:picChg>
-        <pc:picChg chg="add mod">
-          <ac:chgData name="Kelly Robertson" userId="1380f86364dddaff" providerId="LiveId" clId="{051780FD-A002-4E3C-A89D-4151B591C4AD}" dt="2022-12-10T23:33:04.937" v="4503" actId="1076"/>
-          <ac:picMkLst>
-            <pc:docMk/>
-            <pc:sldMk cId="1856399602" sldId="266"/>
-            <ac:picMk id="4" creationId="{F40B9ECE-91B1-16E8-5C2F-8D7B849BA8A2}"/>
-          </ac:picMkLst>
-        </pc:picChg>
-        <pc:picChg chg="add del">
-          <ac:chgData name="Kelly Robertson" userId="1380f86364dddaff" providerId="LiveId" clId="{051780FD-A002-4E3C-A89D-4151B591C4AD}" dt="2022-12-07T01:52:00.945" v="1550" actId="22"/>
-          <ac:picMkLst>
-            <pc:docMk/>
-            <pc:sldMk cId="1856399602" sldId="266"/>
-            <ac:picMk id="6" creationId="{7D9E762D-CB06-4681-D1D9-D64A5EDA85B3}"/>
-          </ac:picMkLst>
-        </pc:picChg>
-        <pc:picChg chg="add mod">
-          <ac:chgData name="Kelly Robertson" userId="1380f86364dddaff" providerId="LiveId" clId="{051780FD-A002-4E3C-A89D-4151B591C4AD}" dt="2022-12-10T23:33:08.015" v="4504" actId="1076"/>
-          <ac:picMkLst>
-            <pc:docMk/>
-            <pc:sldMk cId="1856399602" sldId="266"/>
-            <ac:picMk id="6" creationId="{A9EAFEB9-4E8C-B23B-9C22-8BA55D15F41C}"/>
-          </ac:picMkLst>
-        </pc:picChg>
-        <pc:picChg chg="add del mod">
-          <ac:chgData name="Kelly Robertson" userId="1380f86364dddaff" providerId="LiveId" clId="{051780FD-A002-4E3C-A89D-4151B591C4AD}" dt="2022-12-10T23:31:13.089" v="4473" actId="478"/>
-          <ac:picMkLst>
-            <pc:docMk/>
-            <pc:sldMk cId="1856399602" sldId="266"/>
-            <ac:picMk id="8" creationId="{03BE7156-02FF-CBD6-FD72-7BDA99B25AC9}"/>
-          </ac:picMkLst>
-        </pc:picChg>
-        <pc:picChg chg="add mod">
-          <ac:chgData name="Kelly Robertson" userId="1380f86364dddaff" providerId="LiveId" clId="{051780FD-A002-4E3C-A89D-4151B591C4AD}" dt="2022-12-10T23:33:09.831" v="4505" actId="1076"/>
-          <ac:picMkLst>
-            <pc:docMk/>
-            <pc:sldMk cId="1856399602" sldId="266"/>
-            <ac:picMk id="9" creationId="{B5506114-6DFD-A7BA-57E8-B16CCCEDE60A}"/>
-          </ac:picMkLst>
-        </pc:picChg>
-        <pc:picChg chg="add del mod">
-          <ac:chgData name="Kelly Robertson" userId="1380f86364dddaff" providerId="LiveId" clId="{051780FD-A002-4E3C-A89D-4151B591C4AD}" dt="2022-12-10T23:31:13.760" v="4475" actId="478"/>
-          <ac:picMkLst>
-            <pc:docMk/>
-            <pc:sldMk cId="1856399602" sldId="266"/>
-            <ac:picMk id="10" creationId="{AADC5935-BC31-7E17-DEFC-168C7A71515D}"/>
-          </ac:picMkLst>
-        </pc:picChg>
-        <pc:picChg chg="add del mod">
-          <ac:chgData name="Kelly Robertson" userId="1380f86364dddaff" providerId="LiveId" clId="{051780FD-A002-4E3C-A89D-4151B591C4AD}" dt="2022-12-10T23:31:14.609" v="4477" actId="478"/>
-          <ac:picMkLst>
-            <pc:docMk/>
-            <pc:sldMk cId="1856399602" sldId="266"/>
-            <ac:picMk id="12" creationId="{5834844F-1F43-D6B2-B9B2-0523AC2F4B60}"/>
-          </ac:picMkLst>
-        </pc:picChg>
-      </pc:sldChg>
-      <pc:sldChg chg="addSp delSp modSp new mod ord setBg">
-        <pc:chgData name="Kelly Robertson" userId="1380f86364dddaff" providerId="LiveId" clId="{051780FD-A002-4E3C-A89D-4151B591C4AD}" dt="2022-12-10T23:47:05.200" v="4721" actId="22"/>
-        <pc:sldMkLst>
-          <pc:docMk/>
-          <pc:sldMk cId="216101166" sldId="267"/>
-        </pc:sldMkLst>
-        <pc:picChg chg="add del mod">
-          <ac:chgData name="Kelly Robertson" userId="1380f86364dddaff" providerId="LiveId" clId="{051780FD-A002-4E3C-A89D-4151B591C4AD}" dt="2022-12-10T23:46:08.992" v="4720" actId="478"/>
-          <ac:picMkLst>
-            <pc:docMk/>
-            <pc:sldMk cId="216101166" sldId="267"/>
-            <ac:picMk id="2" creationId="{F8CC8661-5184-98B8-0017-05B4ADACE17F}"/>
-          </ac:picMkLst>
-        </pc:picChg>
-        <pc:picChg chg="add">
-          <ac:chgData name="Kelly Robertson" userId="1380f86364dddaff" providerId="LiveId" clId="{051780FD-A002-4E3C-A89D-4151B591C4AD}" dt="2022-12-10T23:47:05.200" v="4721" actId="22"/>
-          <ac:picMkLst>
-            <pc:docMk/>
-            <pc:sldMk cId="216101166" sldId="267"/>
-            <ac:picMk id="4" creationId="{63BA5790-286B-715E-60B8-BF6275E394A8}"/>
-          </ac:picMkLst>
-        </pc:picChg>
-      </pc:sldChg>
-      <pc:sldChg chg="addSp delSp modSp new mod modNotesTx">
-        <pc:chgData name="Kelly Robertson" userId="1380f86364dddaff" providerId="LiveId" clId="{051780FD-A002-4E3C-A89D-4151B591C4AD}" dt="2022-12-10T23:45:57.041" v="4719" actId="20577"/>
-        <pc:sldMkLst>
-          <pc:docMk/>
-          <pc:sldMk cId="1213217814" sldId="268"/>
-        </pc:sldMkLst>
-        <pc:spChg chg="mod">
-          <ac:chgData name="Kelly Robertson" userId="1380f86364dddaff" providerId="LiveId" clId="{051780FD-A002-4E3C-A89D-4151B591C4AD}" dt="2022-12-07T02:27:31.332" v="3735" actId="403"/>
-          <ac:spMkLst>
-            <pc:docMk/>
-            <pc:sldMk cId="1213217814" sldId="268"/>
-            <ac:spMk id="2" creationId="{2F120083-9E2A-1252-7E68-47D78453766B}"/>
-          </ac:spMkLst>
-        </pc:spChg>
-        <pc:spChg chg="del">
-          <ac:chgData name="Kelly Robertson" userId="1380f86364dddaff" providerId="LiveId" clId="{051780FD-A002-4E3C-A89D-4151B591C4AD}" dt="2022-12-07T02:13:55.614" v="3192" actId="478"/>
-          <ac:spMkLst>
-            <pc:docMk/>
-            <pc:sldMk cId="1213217814" sldId="268"/>
-            <ac:spMk id="3" creationId="{7E75B2AC-A04D-1886-339C-947A70E189B9}"/>
-          </ac:spMkLst>
-        </pc:spChg>
-        <pc:spChg chg="mod">
-          <ac:chgData name="Kelly Robertson" userId="1380f86364dddaff" providerId="LiveId" clId="{051780FD-A002-4E3C-A89D-4151B591C4AD}" dt="2022-12-10T23:45:57.041" v="4719" actId="20577"/>
-          <ac:spMkLst>
-            <pc:docMk/>
-            <pc:sldMk cId="1213217814" sldId="268"/>
-            <ac:spMk id="4" creationId="{C697D2A6-E87C-A929-6DF7-4E8CF484A34B}"/>
-          </ac:spMkLst>
-        </pc:spChg>
-        <pc:spChg chg="add del mod">
-          <ac:chgData name="Kelly Robertson" userId="1380f86364dddaff" providerId="LiveId" clId="{051780FD-A002-4E3C-A89D-4151B591C4AD}" dt="2022-12-07T02:28:02.035" v="3741" actId="478"/>
-          <ac:spMkLst>
-            <pc:docMk/>
-            <pc:sldMk cId="1213217814" sldId="268"/>
-            <ac:spMk id="7" creationId="{A9BE00AB-C0B4-921D-26DB-29223546600B}"/>
-          </ac:spMkLst>
-        </pc:spChg>
-        <pc:spChg chg="add del">
-          <ac:chgData name="Kelly Robertson" userId="1380f86364dddaff" providerId="LiveId" clId="{051780FD-A002-4E3C-A89D-4151B591C4AD}" dt="2022-12-07T02:32:02.913" v="4029" actId="11529"/>
-          <ac:spMkLst>
-            <pc:docMk/>
-            <pc:sldMk cId="1213217814" sldId="268"/>
-            <ac:spMk id="8" creationId="{8762F10B-581A-CE02-1C65-E4E7336A6EBD}"/>
-          </ac:spMkLst>
-        </pc:spChg>
-        <pc:spChg chg="add mod">
-          <ac:chgData name="Kelly Robertson" userId="1380f86364dddaff" providerId="LiveId" clId="{051780FD-A002-4E3C-A89D-4151B591C4AD}" dt="2022-12-10T23:44:53.024" v="4712" actId="20577"/>
-          <ac:spMkLst>
-            <pc:docMk/>
-            <pc:sldMk cId="1213217814" sldId="268"/>
-            <ac:spMk id="9" creationId="{93B8A875-AC5D-FEB4-D346-0A1E6A8880AC}"/>
-          </ac:spMkLst>
-        </pc:spChg>
-        <pc:picChg chg="add mod">
-          <ac:chgData name="Kelly Robertson" userId="1380f86364dddaff" providerId="LiveId" clId="{051780FD-A002-4E3C-A89D-4151B591C4AD}" dt="2022-12-10T23:44:48.176" v="4708" actId="1076"/>
-          <ac:picMkLst>
-            <pc:docMk/>
-            <pc:sldMk cId="1213217814" sldId="268"/>
-            <ac:picMk id="5" creationId="{F6448F6F-5095-D7EC-E0C4-702178F849B8}"/>
-          </ac:picMkLst>
-        </pc:picChg>
-        <pc:picChg chg="add del mod">
-          <ac:chgData name="Kelly Robertson" userId="1380f86364dddaff" providerId="LiveId" clId="{051780FD-A002-4E3C-A89D-4151B591C4AD}" dt="2022-12-10T23:39:55.737" v="4688" actId="478"/>
-          <ac:picMkLst>
-            <pc:docMk/>
-            <pc:sldMk cId="1213217814" sldId="268"/>
-            <ac:picMk id="6" creationId="{C7C3746B-5EFF-3245-EFFC-BFD20CAA5B69}"/>
-          </ac:picMkLst>
-        </pc:picChg>
-      </pc:sldChg>
-      <pc:sldChg chg="modSp new mod">
-        <pc:chgData name="Kelly Robertson" userId="1380f86364dddaff" providerId="LiveId" clId="{051780FD-A002-4E3C-A89D-4151B591C4AD}" dt="2022-12-07T02:18:31.894" v="3422" actId="20577"/>
-        <pc:sldMkLst>
-          <pc:docMk/>
-          <pc:sldMk cId="763983594" sldId="269"/>
-        </pc:sldMkLst>
-        <pc:spChg chg="mod">
-          <ac:chgData name="Kelly Robertson" userId="1380f86364dddaff" providerId="LiveId" clId="{051780FD-A002-4E3C-A89D-4151B591C4AD}" dt="2022-12-07T02:18:31.894" v="3422" actId="20577"/>
-          <ac:spMkLst>
-            <pc:docMk/>
-            <pc:sldMk cId="763983594" sldId="269"/>
-            <ac:spMk id="2" creationId="{33A7C3D0-7458-F1BA-7F80-D265A5BEB0EF}"/>
-          </ac:spMkLst>
-        </pc:spChg>
-      </pc:sldChg>
-      <pc:sldChg chg="delSp modSp new mod">
-        <pc:chgData name="Kelly Robertson" userId="1380f86364dddaff" providerId="LiveId" clId="{051780FD-A002-4E3C-A89D-4151B591C4AD}" dt="2022-12-07T02:36:13.246" v="4168" actId="478"/>
-        <pc:sldMkLst>
-          <pc:docMk/>
-          <pc:sldMk cId="1216971372" sldId="270"/>
-        </pc:sldMkLst>
-        <pc:spChg chg="mod">
-          <ac:chgData name="Kelly Robertson" userId="1380f86364dddaff" providerId="LiveId" clId="{051780FD-A002-4E3C-A89D-4151B591C4AD}" dt="2022-12-07T02:36:10.011" v="4167" actId="403"/>
-          <ac:spMkLst>
-            <pc:docMk/>
-            <pc:sldMk cId="1216971372" sldId="270"/>
-            <ac:spMk id="2" creationId="{D8D22D1B-705B-62ED-CF3F-2216FE740787}"/>
-          </ac:spMkLst>
-        </pc:spChg>
-        <pc:spChg chg="del">
-          <ac:chgData name="Kelly Robertson" userId="1380f86364dddaff" providerId="LiveId" clId="{051780FD-A002-4E3C-A89D-4151B591C4AD}" dt="2022-12-07T02:36:13.246" v="4168" actId="478"/>
-          <ac:spMkLst>
-            <pc:docMk/>
-            <pc:sldMk cId="1216971372" sldId="270"/>
-            <ac:spMk id="3" creationId="{09F5E54C-5BD1-54C6-FD2E-AA3A00C054CD}"/>
-          </ac:spMkLst>
-        </pc:spChg>
-      </pc:sldChg>
-      <pc:sldChg chg="addSp delSp modSp new mod">
-        <pc:chgData name="Kelly Robertson" userId="1380f86364dddaff" providerId="LiveId" clId="{051780FD-A002-4E3C-A89D-4151B591C4AD}" dt="2022-12-10T23:49:26.612" v="4769" actId="403"/>
-        <pc:sldMkLst>
-          <pc:docMk/>
-          <pc:sldMk cId="4233994120" sldId="271"/>
-        </pc:sldMkLst>
-        <pc:spChg chg="mod">
-          <ac:chgData name="Kelly Robertson" userId="1380f86364dddaff" providerId="LiveId" clId="{051780FD-A002-4E3C-A89D-4151B591C4AD}" dt="2022-12-10T23:49:26.612" v="4769" actId="403"/>
-          <ac:spMkLst>
-            <pc:docMk/>
-            <pc:sldMk cId="4233994120" sldId="271"/>
-            <ac:spMk id="2" creationId="{A897B7C9-A9D5-C9E6-B665-DBD6060660AC}"/>
-          </ac:spMkLst>
-        </pc:spChg>
-        <pc:spChg chg="del">
-          <ac:chgData name="Kelly Robertson" userId="1380f86364dddaff" providerId="LiveId" clId="{051780FD-A002-4E3C-A89D-4151B591C4AD}" dt="2022-12-10T23:48:35.393" v="4723" actId="478"/>
-          <ac:spMkLst>
-            <pc:docMk/>
-            <pc:sldMk cId="4233994120" sldId="271"/>
-            <ac:spMk id="3" creationId="{6701873F-14BB-4376-E1AB-CFC0217264D7}"/>
-          </ac:spMkLst>
-        </pc:spChg>
-        <pc:spChg chg="del">
-          <ac:chgData name="Kelly Robertson" userId="1380f86364dddaff" providerId="LiveId" clId="{051780FD-A002-4E3C-A89D-4151B591C4AD}" dt="2022-12-10T23:48:48.594" v="4726" actId="478"/>
-          <ac:spMkLst>
-            <pc:docMk/>
-            <pc:sldMk cId="4233994120" sldId="271"/>
-            <ac:spMk id="4" creationId="{1FE506BB-A398-544B-3ADE-EE8CB09ED740}"/>
-          </ac:spMkLst>
-        </pc:spChg>
-        <pc:picChg chg="add mod">
-          <ac:chgData name="Kelly Robertson" userId="1380f86364dddaff" providerId="LiveId" clId="{051780FD-A002-4E3C-A89D-4151B591C4AD}" dt="2022-12-10T23:48:38.657" v="4725" actId="1076"/>
-          <ac:picMkLst>
-            <pc:docMk/>
-            <pc:sldMk cId="4233994120" sldId="271"/>
-            <ac:picMk id="5" creationId="{E2E84746-B40F-D292-5A82-EE7D1C7EC060}"/>
-          </ac:picMkLst>
-        </pc:picChg>
-        <pc:picChg chg="add mod">
-          <ac:chgData name="Kelly Robertson" userId="1380f86364dddaff" providerId="LiveId" clId="{051780FD-A002-4E3C-A89D-4151B591C4AD}" dt="2022-12-10T23:49:03.841" v="4729" actId="1076"/>
-          <ac:picMkLst>
-            <pc:docMk/>
-            <pc:sldMk cId="4233994120" sldId="271"/>
-            <ac:picMk id="6" creationId="{05234CFD-0816-D871-B541-152E78250946}"/>
-          </ac:picMkLst>
-        </pc:picChg>
-        <pc:picChg chg="add mod">
-          <ac:chgData name="Kelly Robertson" userId="1380f86364dddaff" providerId="LiveId" clId="{051780FD-A002-4E3C-A89D-4151B591C4AD}" dt="2022-12-10T23:49:08.559" v="4730" actId="1076"/>
-          <ac:picMkLst>
-            <pc:docMk/>
-            <pc:sldMk cId="4233994120" sldId="271"/>
-            <ac:picMk id="7" creationId="{5347DF84-5113-C674-DE8F-46A08F01DE98}"/>
-          </ac:picMkLst>
-        </pc:picChg>
-      </pc:sldChg>
-      <pc:sldMasterChg chg="modSldLayout">
-        <pc:chgData name="Kelly Robertson" userId="1380f86364dddaff" providerId="LiveId" clId="{051780FD-A002-4E3C-A89D-4151B591C4AD}" dt="2022-12-07T00:13:25.309" v="1064" actId="478"/>
-        <pc:sldMasterMkLst>
-          <pc:docMk/>
-          <pc:sldMasterMk cId="82855549" sldId="2147483672"/>
-        </pc:sldMasterMkLst>
-        <pc:sldLayoutChg chg="modSp mod">
-          <pc:chgData name="Kelly Robertson" userId="1380f86364dddaff" providerId="LiveId" clId="{051780FD-A002-4E3C-A89D-4151B591C4AD}" dt="2022-12-07T00:11:25.375" v="1062" actId="16037"/>
-          <pc:sldLayoutMkLst>
-            <pc:docMk/>
-            <pc:sldMasterMk cId="82855549" sldId="2147483672"/>
-            <pc:sldLayoutMk cId="2103018600" sldId="2147483673"/>
-          </pc:sldLayoutMkLst>
-          <pc:spChg chg="mod">
-            <ac:chgData name="Kelly Robertson" userId="1380f86364dddaff" providerId="LiveId" clId="{051780FD-A002-4E3C-A89D-4151B591C4AD}" dt="2022-12-07T00:11:25.375" v="1062" actId="16037"/>
-            <ac:spMkLst>
-              <pc:docMk/>
-              <pc:sldMasterMk cId="82855549" sldId="2147483672"/>
-              <pc:sldLayoutMk cId="2103018600" sldId="2147483673"/>
-              <ac:spMk id="7" creationId="{00000000-0000-0000-0000-000000000000}"/>
-            </ac:spMkLst>
-          </pc:spChg>
-        </pc:sldLayoutChg>
-        <pc:sldLayoutChg chg="delSp modSp mod">
-          <pc:chgData name="Kelly Robertson" userId="1380f86364dddaff" providerId="LiveId" clId="{051780FD-A002-4E3C-A89D-4151B591C4AD}" dt="2022-12-07T00:13:25.309" v="1064" actId="478"/>
-          <pc:sldLayoutMkLst>
-            <pc:docMk/>
-            <pc:sldMasterMk cId="82855549" sldId="2147483672"/>
-            <pc:sldLayoutMk cId="3909290883" sldId="2147483675"/>
-          </pc:sldLayoutMkLst>
-          <pc:spChg chg="del mod">
-            <ac:chgData name="Kelly Robertson" userId="1380f86364dddaff" providerId="LiveId" clId="{051780FD-A002-4E3C-A89D-4151B591C4AD}" dt="2022-12-07T00:13:25.309" v="1064" actId="478"/>
-            <ac:spMkLst>
-              <pc:docMk/>
-              <pc:sldMasterMk cId="82855549" sldId="2147483672"/>
-              <pc:sldLayoutMk cId="3909290883" sldId="2147483675"/>
-              <ac:spMk id="8" creationId="{00000000-0000-0000-0000-000000000000}"/>
-            </ac:spMkLst>
-          </pc:spChg>
-        </pc:sldLayoutChg>
-        <pc:sldLayoutChg chg="modSp">
-          <pc:chgData name="Kelly Robertson" userId="1380f86364dddaff" providerId="LiveId" clId="{051780FD-A002-4E3C-A89D-4151B591C4AD}" dt="2022-12-07T00:07:01.696" v="1038" actId="735"/>
-          <pc:sldLayoutMkLst>
-            <pc:docMk/>
-            <pc:sldMasterMk cId="82855549" sldId="2147483672"/>
-            <pc:sldLayoutMk cId="4291526879" sldId="2147483683"/>
-          </pc:sldLayoutMkLst>
-        </pc:sldLayoutChg>
-      </pc:sldMasterChg>
-      <pc:sldMasterChg chg="modSp">
-        <pc:chgData name="Kelly Robertson" userId="1380f86364dddaff" providerId="LiveId" clId="{051780FD-A002-4E3C-A89D-4151B591C4AD}" dt="2022-12-07T00:07:17.078" v="1044" actId="735"/>
-        <pc:sldMasterMkLst>
-          <pc:docMk/>
-          <pc:sldMasterMk cId="383127951" sldId="2147483684"/>
-        </pc:sldMasterMkLst>
-      </pc:sldMasterChg>
-      <pc:sldMasterChg chg="modSp">
-        <pc:chgData name="Kelly Robertson" userId="1380f86364dddaff" providerId="LiveId" clId="{051780FD-A002-4E3C-A89D-4151B591C4AD}" dt="2022-12-07T00:06:55.454" v="1032" actId="735"/>
-        <pc:sldMasterMkLst>
-          <pc:docMk/>
-          <pc:sldMasterMk cId="2811895517" sldId="2147483684"/>
-        </pc:sldMasterMkLst>
-      </pc:sldMasterChg>
-    </pc:docChg>
-  </pc:docChgLst>
-</pc:chgInfo>
 </file>
 
 <file path=ppt/diagrams/colors1.xml><?xml version="1.0" encoding="utf-8"?>
@@ -6745,7 +5659,7 @@
           <a:p>
             <a:fld id="{AF869721-F543-4A6C-BF9D-65D7CC540427}" type="datetimeFigureOut">
               <a:rPr lang="en-US" smtClean="0"/>
-              <a:t>12/10/2022</a:t>
+              <a:t>12/12/2022</a:t>
             </a:fld>
             <a:endParaRPr lang="en-US" dirty="0"/>
           </a:p>
@@ -6922,7 +5836,7 @@
           <a:p>
             <a:fld id="{C732326A-4C88-4AFB-AA5B-5919D81DFF5B}" type="datetimeFigureOut">
               <a:rPr lang="en-US" smtClean="0"/>
-              <a:t>12/10/2022</a:t>
+              <a:t>12/12/2022</a:t>
             </a:fld>
             <a:endParaRPr lang="en-US" dirty="0"/>
           </a:p>
@@ -8910,7 +7824,7 @@
             <a:fld id="{B61BEF0D-F0BB-DE4B-95CE-6DB70DBA9567}" type="datetimeFigureOut">
               <a:rPr lang="en-US" smtClean="0"/>
               <a:pPr/>
-              <a:t>12/10/2022</a:t>
+              <a:t>12/12/2022</a:t>
             </a:fld>
             <a:endParaRPr lang="en-US" dirty="0"/>
           </a:p>
@@ -9190,7 +8104,7 @@
             <a:fld id="{B61BEF0D-F0BB-DE4B-95CE-6DB70DBA9567}" type="datetimeFigureOut">
               <a:rPr lang="en-US" smtClean="0"/>
               <a:pPr/>
-              <a:t>12/10/2022</a:t>
+              <a:t>12/12/2022</a:t>
             </a:fld>
             <a:endParaRPr lang="en-US" dirty="0"/>
           </a:p>
@@ -9427,7 +8341,7 @@
             <a:fld id="{B61BEF0D-F0BB-DE4B-95CE-6DB70DBA9567}" type="datetimeFigureOut">
               <a:rPr lang="en-US" smtClean="0"/>
               <a:pPr/>
-              <a:t>12/10/2022</a:t>
+              <a:t>12/12/2022</a:t>
             </a:fld>
             <a:endParaRPr lang="en-US" dirty="0"/>
           </a:p>
@@ -9685,7 +8599,7 @@
             <a:fld id="{B61BEF0D-F0BB-DE4B-95CE-6DB70DBA9567}" type="datetimeFigureOut">
               <a:rPr lang="en-US" smtClean="0"/>
               <a:pPr/>
-              <a:t>12/10/2022</a:t>
+              <a:t>12/12/2022</a:t>
             </a:fld>
             <a:endParaRPr lang="en-US" dirty="0"/>
           </a:p>
@@ -9955,7 +8869,7 @@
             <a:fld id="{B61BEF0D-F0BB-DE4B-95CE-6DB70DBA9567}" type="datetimeFigureOut">
               <a:rPr lang="en-US" smtClean="0"/>
               <a:pPr/>
-              <a:t>12/10/2022</a:t>
+              <a:t>12/12/2022</a:t>
             </a:fld>
             <a:endParaRPr lang="en-US" dirty="0"/>
           </a:p>
@@ -10259,7 +9173,7 @@
             <a:fld id="{B61BEF0D-F0BB-DE4B-95CE-6DB70DBA9567}" type="datetimeFigureOut">
               <a:rPr lang="en-US" smtClean="0"/>
               <a:pPr/>
-              <a:t>12/10/2022</a:t>
+              <a:t>12/12/2022</a:t>
             </a:fld>
             <a:endParaRPr lang="en-US" dirty="0"/>
           </a:p>
@@ -10683,7 +9597,7 @@
             <a:fld id="{B61BEF0D-F0BB-DE4B-95CE-6DB70DBA9567}" type="datetimeFigureOut">
               <a:rPr lang="en-US" smtClean="0"/>
               <a:pPr/>
-              <a:t>12/10/2022</a:t>
+              <a:t>12/12/2022</a:t>
             </a:fld>
             <a:endParaRPr lang="en-US" dirty="0"/>
           </a:p>
@@ -10780,7 +9694,7 @@
             <a:fld id="{B61BEF0D-F0BB-DE4B-95CE-6DB70DBA9567}" type="datetimeFigureOut">
               <a:rPr lang="en-US" smtClean="0"/>
               <a:pPr/>
-              <a:t>12/10/2022</a:t>
+              <a:t>12/12/2022</a:t>
             </a:fld>
             <a:endParaRPr lang="en-US" dirty="0"/>
           </a:p>
@@ -10944,7 +9858,7 @@
             <a:fld id="{B61BEF0D-F0BB-DE4B-95CE-6DB70DBA9567}" type="datetimeFigureOut">
               <a:rPr lang="en-US" smtClean="0"/>
               <a:pPr/>
-              <a:t>12/10/2022</a:t>
+              <a:t>12/12/2022</a:t>
             </a:fld>
             <a:endParaRPr lang="en-US" dirty="0"/>
           </a:p>
@@ -11324,7 +10238,7 @@
             <a:fld id="{B61BEF0D-F0BB-DE4B-95CE-6DB70DBA9567}" type="datetimeFigureOut">
               <a:rPr lang="en-US" smtClean="0"/>
               <a:pPr/>
-              <a:t>12/10/2022</a:t>
+              <a:t>12/12/2022</a:t>
             </a:fld>
             <a:endParaRPr lang="en-US" dirty="0"/>
           </a:p>
@@ -11615,7 +10529,7 @@
             <a:fld id="{B61BEF0D-F0BB-DE4B-95CE-6DB70DBA9567}" type="datetimeFigureOut">
               <a:rPr lang="en-US" smtClean="0"/>
               <a:pPr/>
-              <a:t>12/10/2022</a:t>
+              <a:t>12/12/2022</a:t>
             </a:fld>
             <a:endParaRPr lang="en-US" dirty="0"/>
           </a:p>
@@ -11828,7 +10742,7 @@
             <a:fld id="{B61BEF0D-F0BB-DE4B-95CE-6DB70DBA9567}" type="datetimeFigureOut">
               <a:rPr lang="en-US" smtClean="0"/>
               <a:pPr/>
-              <a:t>12/10/2022</a:t>
+              <a:t>12/12/2022</a:t>
             </a:fld>
             <a:endParaRPr lang="en-US" dirty="0"/>
           </a:p>
@@ -14946,96 +13860,6 @@
           </a:p>
         </p:txBody>
       </p:sp>
-      <p:pic>
-        <p:nvPicPr>
-          <p:cNvPr id="4" name="Picture 3">
-            <a:extLst>
-              <a:ext uri="{FF2B5EF4-FFF2-40B4-BE49-F238E27FC236}">
-                <a16:creationId xmlns:a16="http://schemas.microsoft.com/office/drawing/2014/main" id="{F40B9ECE-91B1-16E8-5C2F-8D7B849BA8A2}"/>
-              </a:ext>
-            </a:extLst>
-          </p:cNvPr>
-          <p:cNvPicPr>
-            <a:picLocks noChangeAspect="1"/>
-          </p:cNvPicPr>
-          <p:nvPr/>
-        </p:nvPicPr>
-        <p:blipFill>
-          <a:blip r:embed="rId3"/>
-          <a:stretch>
-            <a:fillRect/>
-          </a:stretch>
-        </p:blipFill>
-        <p:spPr>
-          <a:xfrm>
-            <a:off x="805665" y="3429000"/>
-            <a:ext cx="3429000" cy="1638300"/>
-          </a:xfrm>
-          <a:prstGeom prst="rect">
-            <a:avLst/>
-          </a:prstGeom>
-        </p:spPr>
-      </p:pic>
-      <p:pic>
-        <p:nvPicPr>
-          <p:cNvPr id="6" name="Picture 5">
-            <a:extLst>
-              <a:ext uri="{FF2B5EF4-FFF2-40B4-BE49-F238E27FC236}">
-                <a16:creationId xmlns:a16="http://schemas.microsoft.com/office/drawing/2014/main" id="{A9EAFEB9-4E8C-B23B-9C22-8BA55D15F41C}"/>
-              </a:ext>
-            </a:extLst>
-          </p:cNvPr>
-          <p:cNvPicPr>
-            <a:picLocks noChangeAspect="1"/>
-          </p:cNvPicPr>
-          <p:nvPr/>
-        </p:nvPicPr>
-        <p:blipFill>
-          <a:blip r:embed="rId4"/>
-          <a:stretch>
-            <a:fillRect/>
-          </a:stretch>
-        </p:blipFill>
-        <p:spPr>
-          <a:xfrm>
-            <a:off x="4371439" y="3387410"/>
-            <a:ext cx="3438525" cy="1619250"/>
-          </a:xfrm>
-          <a:prstGeom prst="rect">
-            <a:avLst/>
-          </a:prstGeom>
-        </p:spPr>
-      </p:pic>
-      <p:pic>
-        <p:nvPicPr>
-          <p:cNvPr id="9" name="Picture 8">
-            <a:extLst>
-              <a:ext uri="{FF2B5EF4-FFF2-40B4-BE49-F238E27FC236}">
-                <a16:creationId xmlns:a16="http://schemas.microsoft.com/office/drawing/2014/main" id="{B5506114-6DFD-A7BA-57E8-B16CCCEDE60A}"/>
-              </a:ext>
-            </a:extLst>
-          </p:cNvPr>
-          <p:cNvPicPr>
-            <a:picLocks noChangeAspect="1"/>
-          </p:cNvPicPr>
-          <p:nvPr/>
-        </p:nvPicPr>
-        <p:blipFill>
-          <a:blip r:embed="rId5"/>
-          <a:stretch>
-            <a:fillRect/>
-          </a:stretch>
-        </p:blipFill>
-        <p:spPr>
-          <a:xfrm>
-            <a:off x="7957337" y="3372619"/>
-            <a:ext cx="3486150" cy="2628900"/>
-          </a:xfrm>
-          <a:prstGeom prst="rect">
-            <a:avLst/>
-          </a:prstGeom>
-        </p:spPr>
-      </p:pic>
       <p:sp>
         <p:nvSpPr>
           <p:cNvPr id="11" name="Rectangle: Beveled 10">
@@ -15087,6 +13911,126 @@
           </a:p>
         </p:txBody>
       </p:sp>
+      <p:pic>
+        <p:nvPicPr>
+          <p:cNvPr id="12" name="Picture 11">
+            <a:extLst>
+              <a:ext uri="{FF2B5EF4-FFF2-40B4-BE49-F238E27FC236}">
+                <a16:creationId xmlns:a16="http://schemas.microsoft.com/office/drawing/2014/main" id="{49F2220D-5B31-F06B-9105-E1FD5FD1B9D1}"/>
+              </a:ext>
+            </a:extLst>
+          </p:cNvPr>
+          <p:cNvPicPr>
+            <a:picLocks noChangeAspect="1"/>
+          </p:cNvPicPr>
+          <p:nvPr/>
+        </p:nvPicPr>
+        <p:blipFill>
+          <a:blip r:embed="rId3"/>
+          <a:stretch>
+            <a:fillRect/>
+          </a:stretch>
+        </p:blipFill>
+        <p:spPr>
+          <a:xfrm>
+            <a:off x="6305482" y="2859213"/>
+            <a:ext cx="2501539" cy="2323810"/>
+          </a:xfrm>
+          <a:prstGeom prst="rect">
+            <a:avLst/>
+          </a:prstGeom>
+        </p:spPr>
+      </p:pic>
+      <p:pic>
+        <p:nvPicPr>
+          <p:cNvPr id="14" name="Picture 13">
+            <a:extLst>
+              <a:ext uri="{FF2B5EF4-FFF2-40B4-BE49-F238E27FC236}">
+                <a16:creationId xmlns:a16="http://schemas.microsoft.com/office/drawing/2014/main" id="{B8D63102-1F96-78B0-C5E6-B861A55F60C7}"/>
+              </a:ext>
+            </a:extLst>
+          </p:cNvPr>
+          <p:cNvPicPr>
+            <a:picLocks noChangeAspect="1"/>
+          </p:cNvPicPr>
+          <p:nvPr/>
+        </p:nvPicPr>
+        <p:blipFill>
+          <a:blip r:embed="rId4"/>
+          <a:stretch>
+            <a:fillRect/>
+          </a:stretch>
+        </p:blipFill>
+        <p:spPr>
+          <a:xfrm>
+            <a:off x="1041118" y="2902226"/>
+            <a:ext cx="2326413" cy="2280797"/>
+          </a:xfrm>
+          <a:prstGeom prst="rect">
+            <a:avLst/>
+          </a:prstGeom>
+        </p:spPr>
+      </p:pic>
+      <p:pic>
+        <p:nvPicPr>
+          <p:cNvPr id="17" name="Picture 16">
+            <a:extLst>
+              <a:ext uri="{FF2B5EF4-FFF2-40B4-BE49-F238E27FC236}">
+                <a16:creationId xmlns:a16="http://schemas.microsoft.com/office/drawing/2014/main" id="{FF4D840D-D013-4C4B-3818-57AB683CDF95}"/>
+              </a:ext>
+            </a:extLst>
+          </p:cNvPr>
+          <p:cNvPicPr>
+            <a:picLocks noChangeAspect="1"/>
+          </p:cNvPicPr>
+          <p:nvPr/>
+        </p:nvPicPr>
+        <p:blipFill>
+          <a:blip r:embed="rId5"/>
+          <a:stretch>
+            <a:fillRect/>
+          </a:stretch>
+        </p:blipFill>
+        <p:spPr>
+          <a:xfrm>
+            <a:off x="3506482" y="2859212"/>
+            <a:ext cx="2680953" cy="2274115"/>
+          </a:xfrm>
+          <a:prstGeom prst="rect">
+            <a:avLst/>
+          </a:prstGeom>
+        </p:spPr>
+      </p:pic>
+      <p:pic>
+        <p:nvPicPr>
+          <p:cNvPr id="21" name="Picture 20">
+            <a:extLst>
+              <a:ext uri="{FF2B5EF4-FFF2-40B4-BE49-F238E27FC236}">
+                <a16:creationId xmlns:a16="http://schemas.microsoft.com/office/drawing/2014/main" id="{72F47B0C-19B1-1A53-AA8B-8DE22144C7A4}"/>
+              </a:ext>
+            </a:extLst>
+          </p:cNvPr>
+          <p:cNvPicPr>
+            <a:picLocks noChangeAspect="1"/>
+          </p:cNvPicPr>
+          <p:nvPr/>
+        </p:nvPicPr>
+        <p:blipFill>
+          <a:blip r:embed="rId6"/>
+          <a:stretch>
+            <a:fillRect/>
+          </a:stretch>
+        </p:blipFill>
+        <p:spPr>
+          <a:xfrm>
+            <a:off x="8885304" y="2859213"/>
+            <a:ext cx="2424602" cy="1389139"/>
+          </a:xfrm>
+          <a:prstGeom prst="rect">
+            <a:avLst/>
+          </a:prstGeom>
+        </p:spPr>
+      </p:pic>
     </p:spTree>
     <p:extLst>
       <p:ext uri="{BB962C8B-B14F-4D97-AF65-F5344CB8AC3E}">

</xml_diff>

<commit_message>
Corrected slide 5 agin
</commit_message>
<xml_diff>
--- a/Dec 2022 Sprint Review.pptx
+++ b/Dec 2022 Sprint Review.pptx
@@ -13913,10 +13913,10 @@
       </p:sp>
       <p:pic>
         <p:nvPicPr>
-          <p:cNvPr id="12" name="Picture 11">
+          <p:cNvPr id="6" name="Picture 5">
             <a:extLst>
               <a:ext uri="{FF2B5EF4-FFF2-40B4-BE49-F238E27FC236}">
-                <a16:creationId xmlns:a16="http://schemas.microsoft.com/office/drawing/2014/main" id="{49F2220D-5B31-F06B-9105-E1FD5FD1B9D1}"/>
+                <a16:creationId xmlns:a16="http://schemas.microsoft.com/office/drawing/2014/main" id="{29A9D6AD-3A32-A923-6DE6-64A0606CDB04}"/>
               </a:ext>
             </a:extLst>
           </p:cNvPr>
@@ -13933,8 +13933,8 @@
         </p:blipFill>
         <p:spPr>
           <a:xfrm>
-            <a:off x="6305482" y="2859213"/>
-            <a:ext cx="2501539" cy="2323810"/>
+            <a:off x="661608" y="2879554"/>
+            <a:ext cx="3600000" cy="3019048"/>
           </a:xfrm>
           <a:prstGeom prst="rect">
             <a:avLst/>
@@ -13943,10 +13943,10 @@
       </p:pic>
       <p:pic>
         <p:nvPicPr>
-          <p:cNvPr id="14" name="Picture 13">
+          <p:cNvPr id="10" name="Picture 9">
             <a:extLst>
               <a:ext uri="{FF2B5EF4-FFF2-40B4-BE49-F238E27FC236}">
-                <a16:creationId xmlns:a16="http://schemas.microsoft.com/office/drawing/2014/main" id="{B8D63102-1F96-78B0-C5E6-B861A55F60C7}"/>
+                <a16:creationId xmlns:a16="http://schemas.microsoft.com/office/drawing/2014/main" id="{CDEECF74-5AC5-E6EA-067A-EFF62A44F6A3}"/>
               </a:ext>
             </a:extLst>
           </p:cNvPr>
@@ -13963,8 +13963,8 @@
         </p:blipFill>
         <p:spPr>
           <a:xfrm>
-            <a:off x="1041118" y="2902226"/>
-            <a:ext cx="2326413" cy="2280797"/>
+            <a:off x="4261608" y="2879554"/>
+            <a:ext cx="3485714" cy="1933333"/>
           </a:xfrm>
           <a:prstGeom prst="rect">
             <a:avLst/>
@@ -13973,10 +13973,10 @@
       </p:pic>
       <p:pic>
         <p:nvPicPr>
-          <p:cNvPr id="17" name="Picture 16">
+          <p:cNvPr id="15" name="Picture 14">
             <a:extLst>
               <a:ext uri="{FF2B5EF4-FFF2-40B4-BE49-F238E27FC236}">
-                <a16:creationId xmlns:a16="http://schemas.microsoft.com/office/drawing/2014/main" id="{FF4D840D-D013-4C4B-3818-57AB683CDF95}"/>
+                <a16:creationId xmlns:a16="http://schemas.microsoft.com/office/drawing/2014/main" id="{AAF18BC8-6774-7636-FDBB-0D8B9C146039}"/>
               </a:ext>
             </a:extLst>
           </p:cNvPr>
@@ -13993,38 +13993,8 @@
         </p:blipFill>
         <p:spPr>
           <a:xfrm>
-            <a:off x="3506482" y="2859212"/>
-            <a:ext cx="2680953" cy="2274115"/>
-          </a:xfrm>
-          <a:prstGeom prst="rect">
-            <a:avLst/>
-          </a:prstGeom>
-        </p:spPr>
-      </p:pic>
-      <p:pic>
-        <p:nvPicPr>
-          <p:cNvPr id="21" name="Picture 20">
-            <a:extLst>
-              <a:ext uri="{FF2B5EF4-FFF2-40B4-BE49-F238E27FC236}">
-                <a16:creationId xmlns:a16="http://schemas.microsoft.com/office/drawing/2014/main" id="{72F47B0C-19B1-1A53-AA8B-8DE22144C7A4}"/>
-              </a:ext>
-            </a:extLst>
-          </p:cNvPr>
-          <p:cNvPicPr>
-            <a:picLocks noChangeAspect="1"/>
-          </p:cNvPicPr>
-          <p:nvPr/>
-        </p:nvPicPr>
-        <p:blipFill>
-          <a:blip r:embed="rId6"/>
-          <a:stretch>
-            <a:fillRect/>
-          </a:stretch>
-        </p:blipFill>
-        <p:spPr>
-          <a:xfrm>
-            <a:off x="8885304" y="2859213"/>
-            <a:ext cx="2424602" cy="1389139"/>
+            <a:off x="7803316" y="2811780"/>
+            <a:ext cx="3495238" cy="3285714"/>
           </a:xfrm>
           <a:prstGeom prst="rect">
             <a:avLst/>

</xml_diff>